<commit_message>
removed some deprecated stuff.
</commit_message>
<xml_diff>
--- a/deprecated/certifier_diagrams.pptx
+++ b/deprecated/certifier_diagrams.pptx
@@ -5,14 +5,12 @@
     <p:sldMasterId id="2147483648" r:id="rId4"/>
   </p:sldMasterIdLst>
   <p:notesMasterIdLst>
-    <p:notesMasterId r:id="rId10"/>
+    <p:notesMasterId r:id="rId8"/>
   </p:notesMasterIdLst>
   <p:sldIdLst>
     <p:sldId id="2026819493" r:id="rId5"/>
     <p:sldId id="2026819489" r:id="rId6"/>
     <p:sldId id="2026819491" r:id="rId7"/>
-    <p:sldId id="2026819461" r:id="rId8"/>
-    <p:sldId id="2026819462" r:id="rId9"/>
   </p:sldIdLst>
   <p:sldSz cx="12192000" cy="6858000"/>
   <p:notesSz cx="6858000" cy="9144000"/>
@@ -201,7 +199,7 @@
           <a:p>
             <a:fld id="{855DC4A4-0E25-1A42-A39F-0844249540CF}" type="datetimeFigureOut">
               <a:rPr lang="en-US" smtClean="0"/>
-              <a:t>7/17/22</a:t>
+              <a:t>8/3/22</a:t>
             </a:fld>
             <a:endParaRPr lang="en-US"/>
           </a:p>
@@ -726,180 +724,6 @@
 </p:notes>
 </file>
 
-<file path=ppt/notesSlides/notesSlide4.xml><?xml version="1.0" encoding="utf-8"?>
-<p:notes xmlns:a="http://schemas.openxmlformats.org/drawingml/2006/main" xmlns:r="http://schemas.openxmlformats.org/officeDocument/2006/relationships" xmlns:p="http://schemas.openxmlformats.org/presentationml/2006/main">
-  <p:cSld>
-    <p:spTree>
-      <p:nvGrpSpPr>
-        <p:cNvPr id="1" name=""/>
-        <p:cNvGrpSpPr/>
-        <p:nvPr/>
-      </p:nvGrpSpPr>
-      <p:grpSpPr>
-        <a:xfrm>
-          <a:off x="0" y="0"/>
-          <a:ext cx="0" cy="0"/>
-          <a:chOff x="0" y="0"/>
-          <a:chExt cx="0" cy="0"/>
-        </a:xfrm>
-      </p:grpSpPr>
-      <p:sp>
-        <p:nvSpPr>
-          <p:cNvPr id="2" name="Slide Image Placeholder 1"/>
-          <p:cNvSpPr>
-            <a:spLocks noGrp="1" noRot="1" noChangeAspect="1"/>
-          </p:cNvSpPr>
-          <p:nvPr>
-            <p:ph type="sldImg"/>
-          </p:nvPr>
-        </p:nvSpPr>
-        <p:spPr/>
-      </p:sp>
-      <p:sp>
-        <p:nvSpPr>
-          <p:cNvPr id="3" name="Notes Placeholder 2"/>
-          <p:cNvSpPr>
-            <a:spLocks noGrp="1"/>
-          </p:cNvSpPr>
-          <p:nvPr>
-            <p:ph type="body" idx="1"/>
-          </p:nvPr>
-        </p:nvSpPr>
-        <p:spPr/>
-        <p:txBody>
-          <a:bodyPr/>
-          <a:lstStyle/>
-          <a:p>
-            <a:r>
-              <a:rPr lang="en-US" dirty="0"/>
-              <a:t>Use this as a template</a:t>
-            </a:r>
-          </a:p>
-        </p:txBody>
-      </p:sp>
-      <p:sp>
-        <p:nvSpPr>
-          <p:cNvPr id="4" name="Slide Number Placeholder 3"/>
-          <p:cNvSpPr>
-            <a:spLocks noGrp="1"/>
-          </p:cNvSpPr>
-          <p:nvPr>
-            <p:ph type="sldNum" sz="quarter" idx="10"/>
-          </p:nvPr>
-        </p:nvSpPr>
-        <p:spPr/>
-        <p:txBody>
-          <a:bodyPr/>
-          <a:lstStyle/>
-          <a:p>
-            <a:fld id="{9F4FBC3A-A12C-40F9-BB8D-BC30C7901396}" type="slidenum">
-              <a:rPr lang="en-US" smtClean="0"/>
-              <a:t>4</a:t>
-            </a:fld>
-            <a:endParaRPr lang="en-US" dirty="0"/>
-          </a:p>
-        </p:txBody>
-      </p:sp>
-    </p:spTree>
-    <p:extLst>
-      <p:ext uri="{BB962C8B-B14F-4D97-AF65-F5344CB8AC3E}">
-        <p14:creationId xmlns:p14="http://schemas.microsoft.com/office/powerpoint/2010/main" val="3471979328"/>
-      </p:ext>
-    </p:extLst>
-  </p:cSld>
-  <p:clrMapOvr>
-    <a:masterClrMapping/>
-  </p:clrMapOvr>
-</p:notes>
-</file>
-
-<file path=ppt/notesSlides/notesSlide5.xml><?xml version="1.0" encoding="utf-8"?>
-<p:notes xmlns:a="http://schemas.openxmlformats.org/drawingml/2006/main" xmlns:r="http://schemas.openxmlformats.org/officeDocument/2006/relationships" xmlns:p="http://schemas.openxmlformats.org/presentationml/2006/main">
-  <p:cSld>
-    <p:spTree>
-      <p:nvGrpSpPr>
-        <p:cNvPr id="1" name=""/>
-        <p:cNvGrpSpPr/>
-        <p:nvPr/>
-      </p:nvGrpSpPr>
-      <p:grpSpPr>
-        <a:xfrm>
-          <a:off x="0" y="0"/>
-          <a:ext cx="0" cy="0"/>
-          <a:chOff x="0" y="0"/>
-          <a:chExt cx="0" cy="0"/>
-        </a:xfrm>
-      </p:grpSpPr>
-      <p:sp>
-        <p:nvSpPr>
-          <p:cNvPr id="2" name="Slide Image Placeholder 1"/>
-          <p:cNvSpPr>
-            <a:spLocks noGrp="1" noRot="1" noChangeAspect="1"/>
-          </p:cNvSpPr>
-          <p:nvPr>
-            <p:ph type="sldImg"/>
-          </p:nvPr>
-        </p:nvSpPr>
-        <p:spPr/>
-      </p:sp>
-      <p:sp>
-        <p:nvSpPr>
-          <p:cNvPr id="3" name="Notes Placeholder 2"/>
-          <p:cNvSpPr>
-            <a:spLocks noGrp="1"/>
-          </p:cNvSpPr>
-          <p:nvPr>
-            <p:ph type="body" idx="1"/>
-          </p:nvPr>
-        </p:nvSpPr>
-        <p:spPr/>
-        <p:txBody>
-          <a:bodyPr/>
-          <a:lstStyle/>
-          <a:p>
-            <a:r>
-              <a:rPr lang="en-US" dirty="0"/>
-              <a:t>Use this as a template</a:t>
-            </a:r>
-          </a:p>
-        </p:txBody>
-      </p:sp>
-      <p:sp>
-        <p:nvSpPr>
-          <p:cNvPr id="4" name="Slide Number Placeholder 3"/>
-          <p:cNvSpPr>
-            <a:spLocks noGrp="1"/>
-          </p:cNvSpPr>
-          <p:nvPr>
-            <p:ph type="sldNum" sz="quarter" idx="10"/>
-          </p:nvPr>
-        </p:nvSpPr>
-        <p:spPr/>
-        <p:txBody>
-          <a:bodyPr/>
-          <a:lstStyle/>
-          <a:p>
-            <a:fld id="{9F4FBC3A-A12C-40F9-BB8D-BC30C7901396}" type="slidenum">
-              <a:rPr lang="en-US" smtClean="0"/>
-              <a:t>5</a:t>
-            </a:fld>
-            <a:endParaRPr lang="en-US" dirty="0"/>
-          </a:p>
-        </p:txBody>
-      </p:sp>
-    </p:spTree>
-    <p:extLst>
-      <p:ext uri="{BB962C8B-B14F-4D97-AF65-F5344CB8AC3E}">
-        <p14:creationId xmlns:p14="http://schemas.microsoft.com/office/powerpoint/2010/main" val="4192755088"/>
-      </p:ext>
-    </p:extLst>
-  </p:cSld>
-  <p:clrMapOvr>
-    <a:masterClrMapping/>
-  </p:clrMapOvr>
-</p:notes>
-</file>
-
 <file path=ppt/slideLayouts/slideLayout1.xml><?xml version="1.0" encoding="utf-8"?>
 <p:sldLayout xmlns:a="http://schemas.openxmlformats.org/drawingml/2006/main" xmlns:r="http://schemas.openxmlformats.org/officeDocument/2006/relationships" xmlns:p="http://schemas.openxmlformats.org/presentationml/2006/main" type="title" preserve="1">
   <p:cSld name="Title Slide">
@@ -1047,7 +871,7 @@
           <a:p>
             <a:fld id="{954B459F-4FD2-0846-B9E6-CEC122635995}" type="datetime1">
               <a:rPr lang="en-US" smtClean="0"/>
-              <a:t>7/17/22</a:t>
+              <a:t>8/3/22</a:t>
             </a:fld>
             <a:endParaRPr lang="en-US"/>
           </a:p>
@@ -1245,7 +1069,7 @@
           <a:p>
             <a:fld id="{ED7D2A8A-7B1D-7149-9EF0-868BDDB93449}" type="datetime1">
               <a:rPr lang="en-US" smtClean="0"/>
-              <a:t>7/17/22</a:t>
+              <a:t>8/3/22</a:t>
             </a:fld>
             <a:endParaRPr lang="en-US"/>
           </a:p>
@@ -1453,7 +1277,7 @@
           <a:p>
             <a:fld id="{0CA74F55-8944-9748-BB75-BD033610B341}" type="datetime1">
               <a:rPr lang="en-US" smtClean="0"/>
-              <a:t>7/17/22</a:t>
+              <a:t>8/3/22</a:t>
             </a:fld>
             <a:endParaRPr lang="en-US"/>
           </a:p>
@@ -1942,7 +1766,7 @@
           <a:p>
             <a:fld id="{923FB715-BA98-2345-AB83-3C75613CD68B}" type="datetime1">
               <a:rPr lang="en-US" smtClean="0"/>
-              <a:t>7/17/22</a:t>
+              <a:t>8/3/22</a:t>
             </a:fld>
             <a:endParaRPr lang="en-US"/>
           </a:p>
@@ -2217,7 +2041,7 @@
           <a:p>
             <a:fld id="{9917063B-8073-EB40-9E63-0B19979AFEB9}" type="datetime1">
               <a:rPr lang="en-US" smtClean="0"/>
-              <a:t>7/17/22</a:t>
+              <a:t>8/3/22</a:t>
             </a:fld>
             <a:endParaRPr lang="en-US"/>
           </a:p>
@@ -2482,7 +2306,7 @@
           <a:p>
             <a:fld id="{1811FD89-88BB-F94D-BED9-2C68AAC00464}" type="datetime1">
               <a:rPr lang="en-US" smtClean="0"/>
-              <a:t>7/17/22</a:t>
+              <a:t>8/3/22</a:t>
             </a:fld>
             <a:endParaRPr lang="en-US"/>
           </a:p>
@@ -2894,7 +2718,7 @@
           <a:p>
             <a:fld id="{20AE5CDC-71A1-9245-8C2F-7DD16AE231A8}" type="datetime1">
               <a:rPr lang="en-US" smtClean="0"/>
-              <a:t>7/17/22</a:t>
+              <a:t>8/3/22</a:t>
             </a:fld>
             <a:endParaRPr lang="en-US"/>
           </a:p>
@@ -3035,7 +2859,7 @@
           <a:p>
             <a:fld id="{D5BB19DB-54A8-B643-A21A-B27B583C66CF}" type="datetime1">
               <a:rPr lang="en-US" smtClean="0"/>
-              <a:t>7/17/22</a:t>
+              <a:t>8/3/22</a:t>
             </a:fld>
             <a:endParaRPr lang="en-US"/>
           </a:p>
@@ -3148,7 +2972,7 @@
           <a:p>
             <a:fld id="{BFF1CF42-59FE-AF49-91ED-7CC0AA0DE49B}" type="datetime1">
               <a:rPr lang="en-US" smtClean="0"/>
-              <a:t>7/17/22</a:t>
+              <a:t>8/3/22</a:t>
             </a:fld>
             <a:endParaRPr lang="en-US"/>
           </a:p>
@@ -3459,7 +3283,7 @@
           <a:p>
             <a:fld id="{7C7DF57A-8625-824F-BC4C-B2A250FF8D81}" type="datetime1">
               <a:rPr lang="en-US" smtClean="0"/>
-              <a:t>7/17/22</a:t>
+              <a:t>8/3/22</a:t>
             </a:fld>
             <a:endParaRPr lang="en-US"/>
           </a:p>
@@ -3747,7 +3571,7 @@
           <a:p>
             <a:fld id="{2DA7514A-8CF2-8F4D-A1B3-44890B787011}" type="datetime1">
               <a:rPr lang="en-US" smtClean="0"/>
-              <a:t>7/17/22</a:t>
+              <a:t>8/3/22</a:t>
             </a:fld>
             <a:endParaRPr lang="en-US"/>
           </a:p>
@@ -3988,7 +3812,7 @@
           <a:p>
             <a:fld id="{730617FB-FCCC-1F40-AFA1-15E67694F973}" type="datetime1">
               <a:rPr lang="en-US" smtClean="0"/>
-              <a:t>7/17/22</a:t>
+              <a:t>8/3/22</a:t>
             </a:fld>
             <a:endParaRPr lang="en-US"/>
           </a:p>
@@ -8377,538 +8201,6 @@
 </p:sld>
 </file>
 
-<file path=ppt/slides/slide4.xml><?xml version="1.0" encoding="utf-8"?>
-<p:sld xmlns:a="http://schemas.openxmlformats.org/drawingml/2006/main" xmlns:r="http://schemas.openxmlformats.org/officeDocument/2006/relationships" xmlns:p="http://schemas.openxmlformats.org/presentationml/2006/main">
-  <p:cSld>
-    <p:spTree>
-      <p:nvGrpSpPr>
-        <p:cNvPr id="1" name=""/>
-        <p:cNvGrpSpPr/>
-        <p:nvPr/>
-      </p:nvGrpSpPr>
-      <p:grpSpPr>
-        <a:xfrm>
-          <a:off x="0" y="0"/>
-          <a:ext cx="0" cy="0"/>
-          <a:chOff x="0" y="0"/>
-          <a:chExt cx="0" cy="0"/>
-        </a:xfrm>
-      </p:grpSpPr>
-      <p:sp>
-        <p:nvSpPr>
-          <p:cNvPr id="8" name="Content Placeholder 7">
-            <a:extLst>
-              <a:ext uri="{FF2B5EF4-FFF2-40B4-BE49-F238E27FC236}">
-                <a16:creationId xmlns:a16="http://schemas.microsoft.com/office/drawing/2014/main" id="{8956C1B3-F4C2-4C00-9CD9-A267ABE7E07C}"/>
-              </a:ext>
-            </a:extLst>
-          </p:cNvPr>
-          <p:cNvSpPr>
-            <a:spLocks noGrp="1"/>
-          </p:cNvSpPr>
-          <p:nvPr>
-            <p:ph sz="quarter" idx="14"/>
-          </p:nvPr>
-        </p:nvSpPr>
-        <p:spPr>
-          <a:xfrm>
-            <a:off x="256868" y="1453786"/>
-            <a:ext cx="11492546" cy="3152663"/>
-          </a:xfrm>
-        </p:spPr>
-        <p:txBody>
-          <a:bodyPr>
-            <a:noAutofit/>
-          </a:bodyPr>
-          <a:lstStyle/>
-          <a:p>
-            <a:pPr lvl="0"/>
-            <a:r>
-              <a:rPr lang="en-US" sz="2000" dirty="0"/>
-              <a:t>Sample code for initialization is in </a:t>
-            </a:r>
-            <a:r>
-              <a:rPr lang="en-US" sz="2000" dirty="0" err="1"/>
-              <a:t>certitier_tests.cc</a:t>
-            </a:r>
-            <a:r>
-              <a:rPr lang="en-US" sz="2000" dirty="0"/>
-              <a:t>, see “</a:t>
-            </a:r>
-            <a:r>
-              <a:rPr lang="en-US" sz="2000" dirty="0" err="1"/>
-              <a:t>test_trust_request_with_local_certifier</a:t>
-            </a:r>
-            <a:r>
-              <a:rPr lang="en-US" sz="2000" dirty="0"/>
-              <a:t>” there.  Basic structure is:</a:t>
-            </a:r>
-          </a:p>
-          <a:p>
-            <a:pPr marL="914400" lvl="1" indent="-457200">
-              <a:buFont typeface="+mj-lt"/>
-              <a:buAutoNum type="arabicPeriod"/>
-            </a:pPr>
-            <a:r>
-              <a:rPr lang="en-US" sz="2000" dirty="0"/>
-              <a:t>Requesting enclave generates enclave authentication key</a:t>
-            </a:r>
-          </a:p>
-          <a:p>
-            <a:pPr marL="914400" lvl="1" indent="-457200">
-              <a:buFont typeface="+mj-lt"/>
-              <a:buAutoNum type="arabicPeriod"/>
-            </a:pPr>
-            <a:r>
-              <a:rPr lang="en-US" sz="2000" dirty="0"/>
-              <a:t>Requesting enclave performs Attest with enclave authentication key named</a:t>
-            </a:r>
-          </a:p>
-          <a:p>
-            <a:pPr marL="914400" lvl="1" indent="-457200">
-              <a:buFont typeface="+mj-lt"/>
-              <a:buAutoNum type="arabicPeriod"/>
-            </a:pPr>
-            <a:r>
-              <a:rPr lang="en-US" sz="2000" dirty="0"/>
-              <a:t>Requesting enclave formats “</a:t>
-            </a:r>
-            <a:r>
-              <a:rPr lang="en-US" sz="2000" dirty="0" err="1"/>
-              <a:t>trust_request_message</a:t>
-            </a:r>
-            <a:r>
-              <a:rPr lang="en-US" sz="2000" dirty="0"/>
-              <a:t>” with metadata, signed claim from platform provider certifying the local attestation key and the result of attest (also a signed claim).  The attest claim names the requesting enclave’s measurement.</a:t>
-            </a:r>
-          </a:p>
-          <a:p>
-            <a:pPr marL="914400" lvl="1" indent="-457200">
-              <a:buFont typeface="+mj-lt"/>
-              <a:buAutoNum type="arabicPeriod"/>
-            </a:pPr>
-            <a:r>
-              <a:rPr lang="en-US" sz="2000" dirty="0"/>
-              <a:t>Providing enclave supplements two claims from the requesting enclave with two claims signed with the providing enclave’s policy key certifying the global platform key and the trusted enclave measurement.</a:t>
-            </a:r>
-          </a:p>
-          <a:p>
-            <a:pPr marL="914400" lvl="1" indent="-457200">
-              <a:buFont typeface="+mj-lt"/>
-              <a:buAutoNum type="arabicPeriod"/>
-            </a:pPr>
-            <a:r>
-              <a:rPr lang="en-US" sz="2000" dirty="0"/>
-              <a:t>Providing enclave constructs proof the “the requesting enclave’s enclave key is-trusted” and submits it to the Local certifier.</a:t>
-            </a:r>
-          </a:p>
-          <a:p>
-            <a:pPr marL="914400" lvl="1" indent="-457200">
-              <a:buFont typeface="+mj-lt"/>
-              <a:buAutoNum type="arabicPeriod"/>
-            </a:pPr>
-            <a:r>
-              <a:rPr lang="en-US" sz="2000" dirty="0"/>
-              <a:t>Local certifier verifies the proof and if it succeeds, signs an X509 certificate for the named enclave key specifying the measurement.</a:t>
-            </a:r>
-          </a:p>
-          <a:p>
-            <a:pPr marL="914400" lvl="1" indent="-457200">
-              <a:buFont typeface="+mj-lt"/>
-              <a:buAutoNum type="arabicPeriod"/>
-            </a:pPr>
-            <a:r>
-              <a:rPr lang="en-US" sz="2000" dirty="0"/>
-              <a:t>Providing enclave returns the certificate in a “</a:t>
-            </a:r>
-            <a:r>
-              <a:rPr lang="en-US" sz="2000" dirty="0" err="1"/>
-              <a:t>trust_response_message</a:t>
-            </a:r>
-            <a:r>
-              <a:rPr lang="en-US" sz="2000" dirty="0"/>
-              <a:t>” to the requesting enclave.</a:t>
-            </a:r>
-          </a:p>
-          <a:p>
-            <a:pPr marL="914400" lvl="1" indent="-457200">
-              <a:buFont typeface="+mj-lt"/>
-              <a:buAutoNum type="arabicPeriod"/>
-            </a:pPr>
-            <a:r>
-              <a:rPr lang="en-US" sz="2000" dirty="0"/>
-              <a:t>Requesting enclave stores the certificate in its local store to open secure channel with providing enclave later.</a:t>
-            </a:r>
-            <a:endParaRPr lang="en-US" sz="1600" dirty="0"/>
-          </a:p>
-        </p:txBody>
-      </p:sp>
-      <p:sp>
-        <p:nvSpPr>
-          <p:cNvPr id="3" name="Title 2">
-            <a:extLst>
-              <a:ext uri="{FF2B5EF4-FFF2-40B4-BE49-F238E27FC236}">
-                <a16:creationId xmlns:a16="http://schemas.microsoft.com/office/drawing/2014/main" id="{77671F3E-BC1F-4B8F-AC6D-76C6CE16CE35}"/>
-              </a:ext>
-            </a:extLst>
-          </p:cNvPr>
-          <p:cNvSpPr>
-            <a:spLocks noGrp="1"/>
-          </p:cNvSpPr>
-          <p:nvPr>
-            <p:ph type="title"/>
-          </p:nvPr>
-        </p:nvSpPr>
-        <p:spPr>
-          <a:xfrm>
-            <a:off x="838200" y="-33870"/>
-            <a:ext cx="10515600" cy="1016634"/>
-          </a:xfrm>
-        </p:spPr>
-        <p:txBody>
-          <a:bodyPr wrap="none" anchor="b">
-            <a:normAutofit/>
-          </a:bodyPr>
-          <a:lstStyle/>
-          <a:p>
-            <a:pPr algn="ctr"/>
-            <a:r>
-              <a:rPr lang="en-US" sz="4000" dirty="0"/>
-              <a:t>Trust negotiation with Local Certification</a:t>
-            </a:r>
-          </a:p>
-        </p:txBody>
-      </p:sp>
-      <p:sp>
-        <p:nvSpPr>
-          <p:cNvPr id="12" name="TextBox 11">
-            <a:extLst>
-              <a:ext uri="{FF2B5EF4-FFF2-40B4-BE49-F238E27FC236}">
-                <a16:creationId xmlns:a16="http://schemas.microsoft.com/office/drawing/2014/main" id="{10648822-2543-4E54-927E-42257488B12E}"/>
-              </a:ext>
-            </a:extLst>
-          </p:cNvPr>
-          <p:cNvSpPr txBox="1"/>
-          <p:nvPr/>
-        </p:nvSpPr>
-        <p:spPr>
-          <a:xfrm>
-            <a:off x="618094" y="1600202"/>
-            <a:ext cx="10584895" cy="3876039"/>
-          </a:xfrm>
-          <a:prstGeom prst="rect">
-            <a:avLst/>
-          </a:prstGeom>
-        </p:spPr>
-        <p:txBody>
-          <a:bodyPr wrap="square" lIns="0" tIns="0" rIns="0" bIns="0" numCol="2" spcCol="457200" rtlCol="0">
-            <a:noAutofit/>
-          </a:bodyPr>
-          <a:lstStyle/>
-          <a:p>
-            <a:pPr>
-              <a:spcBef>
-                <a:spcPts val="1200"/>
-              </a:spcBef>
-            </a:pPr>
-            <a:endParaRPr lang="en-US" sz="1200" dirty="0">
-              <a:solidFill>
-                <a:schemeClr val="tx2"/>
-              </a:solidFill>
-            </a:endParaRPr>
-          </a:p>
-        </p:txBody>
-      </p:sp>
-    </p:spTree>
-    <p:extLst>
-      <p:ext uri="{BB962C8B-B14F-4D97-AF65-F5344CB8AC3E}">
-        <p14:creationId xmlns:p14="http://schemas.microsoft.com/office/powerpoint/2010/main" val="2023284641"/>
-      </p:ext>
-    </p:extLst>
-  </p:cSld>
-  <p:clrMapOvr>
-    <a:masterClrMapping/>
-  </p:clrMapOvr>
-  <mc:AlternateContent xmlns:mc="http://schemas.openxmlformats.org/markup-compatibility/2006" xmlns:p14="http://schemas.microsoft.com/office/powerpoint/2010/main">
-    <mc:Choice Requires="p14">
-      <p:transition spd="med" p14:dur="700">
-        <p:fade/>
-      </p:transition>
-    </mc:Choice>
-    <mc:Fallback xmlns="">
-      <p:transition spd="med">
-        <p:fade/>
-      </p:transition>
-    </mc:Fallback>
-  </mc:AlternateContent>
-</p:sld>
-</file>
-
-<file path=ppt/slides/slide5.xml><?xml version="1.0" encoding="utf-8"?>
-<p:sld xmlns:a="http://schemas.openxmlformats.org/drawingml/2006/main" xmlns:r="http://schemas.openxmlformats.org/officeDocument/2006/relationships" xmlns:p="http://schemas.openxmlformats.org/presentationml/2006/main">
-  <p:cSld>
-    <p:spTree>
-      <p:nvGrpSpPr>
-        <p:cNvPr id="1" name=""/>
-        <p:cNvGrpSpPr/>
-        <p:nvPr/>
-      </p:nvGrpSpPr>
-      <p:grpSpPr>
-        <a:xfrm>
-          <a:off x="0" y="0"/>
-          <a:ext cx="0" cy="0"/>
-          <a:chOff x="0" y="0"/>
-          <a:chExt cx="0" cy="0"/>
-        </a:xfrm>
-      </p:grpSpPr>
-      <p:sp>
-        <p:nvSpPr>
-          <p:cNvPr id="8" name="Content Placeholder 7">
-            <a:extLst>
-              <a:ext uri="{FF2B5EF4-FFF2-40B4-BE49-F238E27FC236}">
-                <a16:creationId xmlns:a16="http://schemas.microsoft.com/office/drawing/2014/main" id="{8956C1B3-F4C2-4C00-9CD9-A267ABE7E07C}"/>
-              </a:ext>
-            </a:extLst>
-          </p:cNvPr>
-          <p:cNvSpPr>
-            <a:spLocks noGrp="1"/>
-          </p:cNvSpPr>
-          <p:nvPr>
-            <p:ph sz="quarter" idx="14"/>
-          </p:nvPr>
-        </p:nvSpPr>
-        <p:spPr>
-          <a:xfrm>
-            <a:off x="469832" y="1610361"/>
-            <a:ext cx="11252335" cy="3152663"/>
-          </a:xfrm>
-        </p:spPr>
-        <p:txBody>
-          <a:bodyPr>
-            <a:noAutofit/>
-          </a:bodyPr>
-          <a:lstStyle/>
-          <a:p>
-            <a:pPr lvl="0"/>
-            <a:r>
-              <a:rPr lang="en-US" sz="2400" dirty="0"/>
-              <a:t>Sample code for initialization is in  </a:t>
-            </a:r>
-            <a:r>
-              <a:rPr lang="en-US" sz="2400" dirty="0" err="1"/>
-              <a:t>certitier_tests.cc</a:t>
-            </a:r>
-            <a:r>
-              <a:rPr lang="en-US" sz="2400" dirty="0"/>
-              <a:t> using </a:t>
-            </a:r>
-            <a:r>
-              <a:rPr lang="en-US" sz="2400" dirty="0" err="1"/>
-              <a:t>Remote_Cerify</a:t>
-            </a:r>
-            <a:r>
-              <a:rPr lang="en-US" sz="2400" dirty="0"/>
-              <a:t>.  Basic structure is:</a:t>
-            </a:r>
-          </a:p>
-          <a:p>
-            <a:pPr marL="914400" lvl="1" indent="-457200">
-              <a:buFont typeface="+mj-lt"/>
-              <a:buAutoNum type="arabicPeriod"/>
-            </a:pPr>
-            <a:r>
-              <a:rPr lang="en-US" sz="2000" dirty="0"/>
-              <a:t>Requesting enclave generates enclave authentication key</a:t>
-            </a:r>
-          </a:p>
-          <a:p>
-            <a:pPr marL="914400" lvl="1" indent="-457200">
-              <a:buFont typeface="+mj-lt"/>
-              <a:buAutoNum type="arabicPeriod"/>
-            </a:pPr>
-            <a:r>
-              <a:rPr lang="en-US" sz="2000" dirty="0"/>
-              <a:t>Requesting enclave performs Attest with enclave authentication key named</a:t>
-            </a:r>
-          </a:p>
-          <a:p>
-            <a:pPr marL="914400" lvl="1" indent="-457200">
-              <a:buFont typeface="+mj-lt"/>
-              <a:buAutoNum type="arabicPeriod"/>
-            </a:pPr>
-            <a:r>
-              <a:rPr lang="en-US" sz="2000" dirty="0"/>
-              <a:t>Requesting enclave formats “</a:t>
-            </a:r>
-            <a:r>
-              <a:rPr lang="en-US" sz="2000" dirty="0" err="1"/>
-              <a:t>trust_request_message</a:t>
-            </a:r>
-            <a:r>
-              <a:rPr lang="en-US" sz="2000" dirty="0"/>
-              <a:t>” with metadata, signed claim from platform provider certifying the local attestation key and the result of attest (also a signed claim).  The attest claim names the requesting enclave’s measurement.</a:t>
-            </a:r>
-          </a:p>
-          <a:p>
-            <a:pPr marL="914400" lvl="1" indent="-457200">
-              <a:buFont typeface="+mj-lt"/>
-              <a:buAutoNum type="arabicPeriod"/>
-            </a:pPr>
-            <a:r>
-              <a:rPr lang="en-US" sz="2000" dirty="0"/>
-              <a:t>Requesting enclave sends </a:t>
-            </a:r>
-            <a:r>
-              <a:rPr lang="en-US" sz="2000" dirty="0" err="1"/>
-              <a:t>trust_request_message</a:t>
-            </a:r>
-            <a:r>
-              <a:rPr lang="en-US" sz="2000" dirty="0"/>
-              <a:t> to service.</a:t>
-            </a:r>
-          </a:p>
-          <a:p>
-            <a:pPr marL="914400" lvl="1" indent="-457200">
-              <a:buFont typeface="+mj-lt"/>
-              <a:buAutoNum type="arabicPeriod"/>
-            </a:pPr>
-            <a:r>
-              <a:rPr lang="en-US" sz="2000" dirty="0"/>
-              <a:t>Remote service evaluates claims and, if it succeeds, signs an X509 certificate for the named enclave authentication key that specifies the measurement with the policy domain policy key.</a:t>
-            </a:r>
-          </a:p>
-          <a:p>
-            <a:pPr marL="914400" lvl="1" indent="-457200">
-              <a:buFont typeface="+mj-lt"/>
-              <a:buAutoNum type="arabicPeriod"/>
-            </a:pPr>
-            <a:r>
-              <a:rPr lang="en-US" sz="2000" dirty="0"/>
-              <a:t>The service returns the certificate in a “</a:t>
-            </a:r>
-            <a:r>
-              <a:rPr lang="en-US" sz="2000" dirty="0" err="1"/>
-              <a:t>trust_response_message</a:t>
-            </a:r>
-            <a:r>
-              <a:rPr lang="en-US" sz="2000" dirty="0"/>
-              <a:t>” to the requesting enclave.</a:t>
-            </a:r>
-          </a:p>
-          <a:p>
-            <a:pPr marL="914400" lvl="1" indent="-457200">
-              <a:buFont typeface="+mj-lt"/>
-              <a:buAutoNum type="arabicPeriod"/>
-            </a:pPr>
-            <a:r>
-              <a:rPr lang="en-US" sz="2000" dirty="0"/>
-              <a:t>Requesting enclave stores the certificate in its local store to open secure channel with any enclave in the policy domain.</a:t>
-            </a:r>
-            <a:endParaRPr lang="en-US" sz="1600" dirty="0"/>
-          </a:p>
-        </p:txBody>
-      </p:sp>
-      <p:sp>
-        <p:nvSpPr>
-          <p:cNvPr id="3" name="Title 2">
-            <a:extLst>
-              <a:ext uri="{FF2B5EF4-FFF2-40B4-BE49-F238E27FC236}">
-                <a16:creationId xmlns:a16="http://schemas.microsoft.com/office/drawing/2014/main" id="{77671F3E-BC1F-4B8F-AC6D-76C6CE16CE35}"/>
-              </a:ext>
-            </a:extLst>
-          </p:cNvPr>
-          <p:cNvSpPr>
-            <a:spLocks noGrp="1"/>
-          </p:cNvSpPr>
-          <p:nvPr>
-            <p:ph type="title"/>
-          </p:nvPr>
-        </p:nvSpPr>
-        <p:spPr>
-          <a:xfrm>
-            <a:off x="838200" y="-33870"/>
-            <a:ext cx="10515600" cy="1016634"/>
-          </a:xfrm>
-        </p:spPr>
-        <p:txBody>
-          <a:bodyPr wrap="none" anchor="b">
-            <a:normAutofit/>
-          </a:bodyPr>
-          <a:lstStyle/>
-          <a:p>
-            <a:pPr algn="ctr"/>
-            <a:r>
-              <a:rPr lang="en-US" sz="4000" dirty="0"/>
-              <a:t>Trust negotiation with Remote Certification</a:t>
-            </a:r>
-          </a:p>
-        </p:txBody>
-      </p:sp>
-      <p:sp>
-        <p:nvSpPr>
-          <p:cNvPr id="12" name="TextBox 11">
-            <a:extLst>
-              <a:ext uri="{FF2B5EF4-FFF2-40B4-BE49-F238E27FC236}">
-                <a16:creationId xmlns:a16="http://schemas.microsoft.com/office/drawing/2014/main" id="{10648822-2543-4E54-927E-42257488B12E}"/>
-              </a:ext>
-            </a:extLst>
-          </p:cNvPr>
-          <p:cNvSpPr txBox="1"/>
-          <p:nvPr/>
-        </p:nvSpPr>
-        <p:spPr>
-          <a:xfrm>
-            <a:off x="618094" y="1600202"/>
-            <a:ext cx="10584895" cy="3876039"/>
-          </a:xfrm>
-          <a:prstGeom prst="rect">
-            <a:avLst/>
-          </a:prstGeom>
-        </p:spPr>
-        <p:txBody>
-          <a:bodyPr wrap="square" lIns="0" tIns="0" rIns="0" bIns="0" numCol="2" spcCol="457200" rtlCol="0">
-            <a:noAutofit/>
-          </a:bodyPr>
-          <a:lstStyle/>
-          <a:p>
-            <a:pPr>
-              <a:spcBef>
-                <a:spcPts val="1200"/>
-              </a:spcBef>
-            </a:pPr>
-            <a:endParaRPr lang="en-US" sz="1200" dirty="0">
-              <a:solidFill>
-                <a:schemeClr val="tx2"/>
-              </a:solidFill>
-            </a:endParaRPr>
-          </a:p>
-        </p:txBody>
-      </p:sp>
-    </p:spTree>
-    <p:extLst>
-      <p:ext uri="{BB962C8B-B14F-4D97-AF65-F5344CB8AC3E}">
-        <p14:creationId xmlns:p14="http://schemas.microsoft.com/office/powerpoint/2010/main" val="3086725311"/>
-      </p:ext>
-    </p:extLst>
-  </p:cSld>
-  <p:clrMapOvr>
-    <a:masterClrMapping/>
-  </p:clrMapOvr>
-  <mc:AlternateContent xmlns:mc="http://schemas.openxmlformats.org/markup-compatibility/2006" xmlns:p14="http://schemas.microsoft.com/office/powerpoint/2010/main">
-    <mc:Choice Requires="p14">
-      <p:transition spd="med" p14:dur="700">
-        <p:fade/>
-      </p:transition>
-    </mc:Choice>
-    <mc:Fallback xmlns="">
-      <p:transition spd="med">
-        <p:fade/>
-      </p:transition>
-    </mc:Fallback>
-  </mc:AlternateContent>
-</p:sld>
-</file>
-
 <file path=ppt/theme/theme1.xml><?xml version="1.0" encoding="utf-8"?>
 <a:theme xmlns:a="http://schemas.openxmlformats.org/drawingml/2006/main" name="Office Theme">
   <a:themeElements>
@@ -9500,18 +8792,18 @@
 </file>
 
 <file path=customXml/item1.xml><?xml version="1.0" encoding="utf-8"?>
-<p:properties xmlns:p="http://schemas.microsoft.com/office/2006/metadata/properties" xmlns:xsi="http://www.w3.org/2001/XMLSchema-instance" xmlns:pc="http://schemas.microsoft.com/office/infopath/2007/PartnerControls">
-  <documentManagement/>
-</p:properties>
-</file>
-
-<file path=customXml/item2.xml><?xml version="1.0" encoding="utf-8"?>
 <?mso-contentType ?>
 <FormTemplates xmlns="http://schemas.microsoft.com/sharepoint/v3/contenttype/forms">
   <Display>DocumentLibraryForm</Display>
   <Edit>DocumentLibraryForm</Edit>
   <New>DocumentLibraryForm</New>
 </FormTemplates>
+</file>
+
+<file path=customXml/item2.xml><?xml version="1.0" encoding="utf-8"?>
+<p:properties xmlns:p="http://schemas.microsoft.com/office/2006/metadata/properties" xmlns:xsi="http://www.w3.org/2001/XMLSchema-instance" xmlns:pc="http://schemas.microsoft.com/office/infopath/2007/PartnerControls">
+  <documentManagement/>
+</p:properties>
 </file>
 
 <file path=customXml/item3.xml><?xml version="1.0" encoding="utf-8"?>
@@ -9732,18 +9024,18 @@
 </file>
 
 <file path=customXml/itemProps1.xml><?xml version="1.0" encoding="utf-8"?>
-<ds:datastoreItem xmlns:ds="http://schemas.openxmlformats.org/officeDocument/2006/customXml" ds:itemID="{79D40EC1-94A3-48FE-82D6-9D650D9C087F}">
+<ds:datastoreItem xmlns:ds="http://schemas.openxmlformats.org/officeDocument/2006/customXml" ds:itemID="{729F02A1-9E85-4EAD-8220-8DB8467E220E}">
   <ds:schemaRefs>
-    <ds:schemaRef ds:uri="http://schemas.microsoft.com/office/2006/metadata/properties"/>
-    <ds:schemaRef ds:uri="http://schemas.microsoft.com/office/infopath/2007/PartnerControls"/>
+    <ds:schemaRef ds:uri="http://schemas.microsoft.com/sharepoint/v3/contenttype/forms"/>
   </ds:schemaRefs>
 </ds:datastoreItem>
 </file>
 
 <file path=customXml/itemProps2.xml><?xml version="1.0" encoding="utf-8"?>
-<ds:datastoreItem xmlns:ds="http://schemas.openxmlformats.org/officeDocument/2006/customXml" ds:itemID="{729F02A1-9E85-4EAD-8220-8DB8467E220E}">
+<ds:datastoreItem xmlns:ds="http://schemas.openxmlformats.org/officeDocument/2006/customXml" ds:itemID="{79D40EC1-94A3-48FE-82D6-9D650D9C087F}">
   <ds:schemaRefs>
-    <ds:schemaRef ds:uri="http://schemas.microsoft.com/sharepoint/v3/contenttype/forms"/>
+    <ds:schemaRef ds:uri="http://schemas.microsoft.com/office/2006/metadata/properties"/>
+    <ds:schemaRef ds:uri="http://schemas.microsoft.com/office/infopath/2007/PartnerControls"/>
   </ds:schemaRefs>
 </ds:datastoreItem>
 </file>

</xml_diff>